<commit_message>
Modified some slides of ML
</commit_message>
<xml_diff>
--- a/Presentation/Presentazione Finale.pptx
+++ b/Presentation/Presentazione Finale.pptx
@@ -36,20 +36,20 @@
   <p:notesSz cx="6858000" cy="9144000"/>
   <p:embeddedFontLst>
     <p:embeddedFont>
-      <p:font typeface="Montserrat" panose="00000500000000000000" pitchFamily="2" charset="0"/>
+      <p:font typeface="Montserrat" pitchFamily="2" charset="77"/>
       <p:regular r:id="rId26"/>
       <p:bold r:id="rId27"/>
       <p:italic r:id="rId28"/>
       <p:boldItalic r:id="rId29"/>
     </p:embeddedFont>
     <p:embeddedFont>
-      <p:font typeface="Montserrat Black" panose="00000A00000000000000" pitchFamily="2" charset="0"/>
+      <p:font typeface="Montserrat Black" panose="020F0502020204030204" pitchFamily="34" charset="0"/>
       <p:bold r:id="rId30"/>
       <p:italic r:id="rId31"/>
       <p:boldItalic r:id="rId32"/>
     </p:embeddedFont>
     <p:embeddedFont>
-      <p:font typeface="Quicksand" panose="020B0604020202020204" charset="0"/>
+      <p:font typeface="Quicksand" pitchFamily="2" charset="77"/>
       <p:regular r:id="rId33"/>
       <p:bold r:id="rId34"/>
     </p:embeddedFont>
@@ -61,7 +61,7 @@
       <p:boldItalic r:id="rId38"/>
     </p:embeddedFont>
     <p:embeddedFont>
-      <p:font typeface="Roboto Condensed Light" panose="02000000000000000000" pitchFamily="2" charset="0"/>
+      <p:font typeface="Roboto Condensed Light" panose="020F0302020204030204" pitchFamily="34" charset="0"/>
       <p:regular r:id="rId39"/>
       <p:italic r:id="rId40"/>
     </p:embeddedFont>
@@ -34588,8 +34588,8 @@
         </p:nvSpPr>
         <p:spPr>
           <a:xfrm>
-            <a:off x="5454041" y="1020995"/>
-            <a:ext cx="3280232" cy="2009617"/>
+            <a:off x="4754892" y="1020995"/>
+            <a:ext cx="3979382" cy="2009617"/>
           </a:xfrm>
           <a:prstGeom prst="rect">
             <a:avLst/>
@@ -34880,7 +34880,7 @@
                 <a:latin typeface="Quicksand"/>
                 <a:sym typeface="Quicksand"/>
               </a:rPr>
-              <a:t>RAVDESS + TESS Datasets</a:t>
+              <a:t>RAVDESS + TESS + EMODB Datasets</a:t>
             </a:r>
           </a:p>
           <a:p>
@@ -36395,12 +36395,59 @@
           </p:txBody>
         </p:sp>
       </p:grpSp>
+      <p:pic>
+        <p:nvPicPr>
+          <p:cNvPr id="3074" name="Picture 2">
+            <a:extLst>
+              <a:ext uri="{FF2B5EF4-FFF2-40B4-BE49-F238E27FC236}">
+                <a16:creationId xmlns:a16="http://schemas.microsoft.com/office/drawing/2014/main" id="{363B6AF5-2C9A-6C40-4F90-89C2E81F1F2A}"/>
+              </a:ext>
+            </a:extLst>
+          </p:cNvPr>
+          <p:cNvPicPr>
+            <a:picLocks noChangeAspect="1" noChangeArrowheads="1"/>
+          </p:cNvPicPr>
+          <p:nvPr/>
+        </p:nvPicPr>
+        <p:blipFill>
+          <a:blip r:embed="rId3">
+            <a:extLst>
+              <a:ext uri="{28A0092B-C50C-407E-A947-70E740481C1C}">
+                <a14:useLocalDpi xmlns:a14="http://schemas.microsoft.com/office/drawing/2010/main" val="0"/>
+              </a:ext>
+            </a:extLst>
+          </a:blip>
+          <a:srcRect/>
+          <a:stretch>
+            <a:fillRect/>
+          </a:stretch>
+        </p:blipFill>
+        <p:spPr bwMode="auto">
+          <a:xfrm>
+            <a:off x="959108" y="1228362"/>
+            <a:ext cx="3009165" cy="2326854"/>
+          </a:xfrm>
+          <a:prstGeom prst="rect">
+            <a:avLst/>
+          </a:prstGeom>
+          <a:noFill/>
+          <a:extLst>
+            <a:ext uri="{909E8E84-426E-40DD-AFC4-6F175D3DCCD1}">
+              <a14:hiddenFill xmlns:a14="http://schemas.microsoft.com/office/drawing/2010/main">
+                <a:solidFill>
+                  <a:srgbClr val="FFFFFF"/>
+                </a:solidFill>
+              </a14:hiddenFill>
+            </a:ext>
+          </a:extLst>
+        </p:spPr>
+      </p:pic>
       <p:graphicFrame>
         <p:nvGraphicFramePr>
-          <p:cNvPr id="3" name="Table 4">
+          <p:cNvPr id="9" name="Table 4">
             <a:extLst>
               <a:ext uri="{FF2B5EF4-FFF2-40B4-BE49-F238E27FC236}">
-                <a16:creationId xmlns:a16="http://schemas.microsoft.com/office/drawing/2014/main" id="{C72C56D9-8435-E7FA-7ADE-EEFC2DCA7B4E}"/>
+                <a16:creationId xmlns:a16="http://schemas.microsoft.com/office/drawing/2014/main" id="{00483131-4E14-C3CB-611E-9F4B047D1318}"/>
               </a:ext>
             </a:extLst>
           </p:cNvPr>
@@ -36410,14 +36457,14 @@
           <p:nvPr>
             <p:extLst>
               <p:ext uri="{D42A27DB-BD31-4B8C-83A1-F6EECF244321}">
-                <p14:modId xmlns:p14="http://schemas.microsoft.com/office/powerpoint/2010/main" val="4198042256"/>
+                <p14:modId xmlns:p14="http://schemas.microsoft.com/office/powerpoint/2010/main" val="1246343181"/>
               </p:ext>
             </p:extLst>
           </p:nvPr>
         </p:nvGraphicFramePr>
         <p:xfrm>
-          <a:off x="4942947" y="2571750"/>
-          <a:ext cx="3540083" cy="1855335"/>
+          <a:off x="4242816" y="3287411"/>
+          <a:ext cx="4658423" cy="889000"/>
         </p:xfrm>
         <a:graphic>
           <a:graphicData uri="http://schemas.openxmlformats.org/drawingml/2006/table">
@@ -36426,22 +36473,29 @@
                 <a:tableStyleId>{A8C71FD8-C1D9-4B4C-9479-EA3EBC3AC847}</a:tableStyleId>
               </a:tblPr>
               <a:tblGrid>
-                <a:gridCol w="983610">
+                <a:gridCol w="1041341">
                   <a:extLst>
                     <a:ext uri="{9D8B030D-6E8A-4147-A177-3AD203B41FA5}">
                       <a16:colId xmlns:a16="http://schemas.microsoft.com/office/drawing/2014/main" val="3112751053"/>
                     </a:ext>
                   </a:extLst>
                 </a:gridCol>
-                <a:gridCol w="2556473">
+                <a:gridCol w="1676588">
                   <a:extLst>
                     <a:ext uri="{9D8B030D-6E8A-4147-A177-3AD203B41FA5}">
                       <a16:colId xmlns:a16="http://schemas.microsoft.com/office/drawing/2014/main" val="1178325965"/>
                     </a:ext>
                   </a:extLst>
                 </a:gridCol>
+                <a:gridCol w="1940494">
+                  <a:extLst>
+                    <a:ext uri="{9D8B030D-6E8A-4147-A177-3AD203B41FA5}">
+                      <a16:colId xmlns:a16="http://schemas.microsoft.com/office/drawing/2014/main" val="3802587097"/>
+                    </a:ext>
+                  </a:extLst>
+                </a:gridCol>
               </a:tblGrid>
-              <a:tr h="371975">
+              <a:tr h="402065">
                 <a:tc>
                   <a:txBody>
                     <a:bodyPr/>
@@ -36465,7 +36519,23 @@
                         <a:rPr lang="en-IT" dirty="0">
                           <a:latin typeface="Quicksand" panose="020B0604020202020204" charset="0"/>
                         </a:rPr>
-                        <a:t>WASSA (train) + User (test)</a:t>
+                        <a:t>Dataset (train and test)</a:t>
+                      </a:r>
+                    </a:p>
+                  </a:txBody>
+                  <a:tcPr/>
+                </a:tc>
+                <a:tc>
+                  <a:txBody>
+                    <a:bodyPr/>
+                    <a:lstStyle/>
+                    <a:p>
+                      <a:pPr algn="ctr"/>
+                      <a:r>
+                        <a:rPr lang="en-IT" dirty="0">
+                          <a:latin typeface="Quicksand" panose="020B0604020202020204" charset="0"/>
+                        </a:rPr>
+                        <a:t>Dataset (train) and User (test)</a:t>
                       </a:r>
                     </a:p>
                   </a:txBody>
@@ -36504,6 +36574,22 @@
                         <a:rPr lang="en-IT" noProof="0" dirty="0">
                           <a:latin typeface="Quicksand" panose="020B0604020202020204" charset="0"/>
                         </a:rPr>
+                        <a:t>0.78</a:t>
+                      </a:r>
+                    </a:p>
+                  </a:txBody>
+                  <a:tcPr/>
+                </a:tc>
+                <a:tc>
+                  <a:txBody>
+                    <a:bodyPr/>
+                    <a:lstStyle/>
+                    <a:p>
+                      <a:pPr algn="ctr"/>
+                      <a:r>
+                        <a:rPr lang="en-IT" noProof="0" dirty="0">
+                          <a:latin typeface="Quicksand" panose="020B0604020202020204" charset="0"/>
+                        </a:rPr>
                         <a:t>0.38</a:t>
                       </a:r>
                     </a:p>
@@ -36516,174 +36602,47 @@
                   </a:ext>
                 </a:extLst>
               </a:tr>
-              <a:tr h="370840">
-                <a:tc>
-                  <a:txBody>
-                    <a:bodyPr/>
-                    <a:lstStyle/>
-                    <a:p>
-                      <a:pPr algn="ctr"/>
-                      <a:r>
-                        <a:rPr lang="en-IT" dirty="0">
-                          <a:latin typeface="Quicksand" panose="020B0604020202020204" charset="0"/>
-                        </a:rPr>
-                        <a:t>Precision</a:t>
-                      </a:r>
-                    </a:p>
-                  </a:txBody>
-                  <a:tcPr/>
-                </a:tc>
-                <a:tc>
-                  <a:txBody>
-                    <a:bodyPr/>
-                    <a:lstStyle/>
-                    <a:p>
-                      <a:pPr algn="ctr"/>
-                      <a:r>
-                        <a:rPr lang="en-IT" dirty="0">
-                          <a:latin typeface="Quicksand" panose="020B0604020202020204" charset="0"/>
-                        </a:rPr>
-                        <a:t>0.50</a:t>
-                      </a:r>
-                    </a:p>
-                  </a:txBody>
-                  <a:tcPr/>
-                </a:tc>
-                <a:extLst>
-                  <a:ext uri="{0D108BD9-81ED-4DB2-BD59-A6C34878D82A}">
-                    <a16:rowId xmlns:a16="http://schemas.microsoft.com/office/drawing/2014/main" val="159716826"/>
-                  </a:ext>
-                </a:extLst>
-              </a:tr>
-              <a:tr h="370840">
-                <a:tc>
-                  <a:txBody>
-                    <a:bodyPr/>
-                    <a:lstStyle/>
-                    <a:p>
-                      <a:pPr algn="ctr"/>
-                      <a:r>
-                        <a:rPr lang="en-IT" dirty="0">
-                          <a:latin typeface="Quicksand" panose="020B0604020202020204" charset="0"/>
-                        </a:rPr>
-                        <a:t>Recall</a:t>
-                      </a:r>
-                    </a:p>
-                  </a:txBody>
-                  <a:tcPr/>
-                </a:tc>
-                <a:tc>
-                  <a:txBody>
-                    <a:bodyPr/>
-                    <a:lstStyle/>
-                    <a:p>
-                      <a:pPr algn="ctr"/>
-                      <a:r>
-                        <a:rPr lang="en-IT" dirty="0">
-                          <a:latin typeface="Quicksand" panose="020B0604020202020204" charset="0"/>
-                        </a:rPr>
-                        <a:t>0.38</a:t>
-                      </a:r>
-                    </a:p>
-                  </a:txBody>
-                  <a:tcPr/>
-                </a:tc>
-                <a:extLst>
-                  <a:ext uri="{0D108BD9-81ED-4DB2-BD59-A6C34878D82A}">
-                    <a16:rowId xmlns:a16="http://schemas.microsoft.com/office/drawing/2014/main" val="3903232360"/>
-                  </a:ext>
-                </a:extLst>
-              </a:tr>
-              <a:tr h="370840">
-                <a:tc>
-                  <a:txBody>
-                    <a:bodyPr/>
-                    <a:lstStyle/>
-                    <a:p>
-                      <a:pPr algn="ctr"/>
-                      <a:r>
-                        <a:rPr lang="en-IT" dirty="0">
-                          <a:latin typeface="Quicksand" panose="020B0604020202020204" charset="0"/>
-                        </a:rPr>
-                        <a:t>F1_score</a:t>
-                      </a:r>
-                    </a:p>
-                  </a:txBody>
-                  <a:tcPr/>
-                </a:tc>
-                <a:tc>
-                  <a:txBody>
-                    <a:bodyPr/>
-                    <a:lstStyle/>
-                    <a:p>
-                      <a:pPr algn="ctr"/>
-                      <a:r>
-                        <a:rPr lang="en-IT" dirty="0">
-                          <a:latin typeface="Quicksand" panose="020B0604020202020204" charset="0"/>
-                        </a:rPr>
-                        <a:t>0.38</a:t>
-                      </a:r>
-                    </a:p>
-                  </a:txBody>
-                  <a:tcPr/>
-                </a:tc>
-                <a:extLst>
-                  <a:ext uri="{0D108BD9-81ED-4DB2-BD59-A6C34878D82A}">
-                    <a16:rowId xmlns:a16="http://schemas.microsoft.com/office/drawing/2014/main" val="2600076669"/>
-                  </a:ext>
-                </a:extLst>
-              </a:tr>
             </a:tbl>
           </a:graphicData>
         </a:graphic>
       </p:graphicFrame>
-      <p:pic>
-        <p:nvPicPr>
-          <p:cNvPr id="3074" name="Picture 2">
+      <p:sp>
+        <p:nvSpPr>
+          <p:cNvPr id="10" name="Rectangle 9">
             <a:extLst>
               <a:ext uri="{FF2B5EF4-FFF2-40B4-BE49-F238E27FC236}">
-                <a16:creationId xmlns:a16="http://schemas.microsoft.com/office/drawing/2014/main" id="{363B6AF5-2C9A-6C40-4F90-89C2E81F1F2A}"/>
+                <a16:creationId xmlns:a16="http://schemas.microsoft.com/office/drawing/2014/main" id="{1B6C1046-77D4-91D6-3093-F81BF352080D}"/>
               </a:ext>
             </a:extLst>
           </p:cNvPr>
-          <p:cNvPicPr>
-            <a:picLocks noChangeAspect="1" noChangeArrowheads="1"/>
-          </p:cNvPicPr>
+          <p:cNvSpPr/>
           <p:nvPr/>
-        </p:nvPicPr>
-        <p:blipFill>
-          <a:blip r:embed="rId3">
-            <a:extLst>
-              <a:ext uri="{28A0092B-C50C-407E-A947-70E740481C1C}">
-                <a14:useLocalDpi xmlns:a14="http://schemas.microsoft.com/office/drawing/2010/main" val="0"/>
-              </a:ext>
-            </a:extLst>
-          </a:blip>
-          <a:srcRect/>
-          <a:stretch>
-            <a:fillRect/>
-          </a:stretch>
-        </p:blipFill>
-        <p:spPr bwMode="auto">
+        </p:nvSpPr>
+        <p:spPr>
           <a:xfrm>
-            <a:off x="1363505" y="1251781"/>
-            <a:ext cx="3009165" cy="2326854"/>
+            <a:off x="4842310" y="2166114"/>
+            <a:ext cx="3398687" cy="307777"/>
           </a:xfrm>
           <a:prstGeom prst="rect">
             <a:avLst/>
           </a:prstGeom>
-          <a:noFill/>
-          <a:extLst>
-            <a:ext uri="{909E8E84-426E-40DD-AFC4-6F175D3DCCD1}">
-              <a14:hiddenFill xmlns:a14="http://schemas.microsoft.com/office/drawing/2010/main">
-                <a:solidFill>
-                  <a:srgbClr val="FFFFFF"/>
-                </a:solidFill>
-              </a14:hiddenFill>
-            </a:ext>
-          </a:extLst>
         </p:spPr>
-      </p:pic>
+        <p:txBody>
+          <a:bodyPr wrap="none">
+            <a:spAutoFit/>
+          </a:bodyPr>
+          <a:lstStyle/>
+          <a:p>
+            <a:r>
+              <a:rPr lang="it-IT" dirty="0">
+                <a:latin typeface="Quicksand" panose="020B0604020202020204" charset="0"/>
+              </a:rPr>
+              <a:t>Dataset = TESS + RAVDESS + EMO-DB</a:t>
+            </a:r>
+            <a:endParaRPr lang="en-IT" dirty="0"/>
+          </a:p>
+        </p:txBody>
+      </p:sp>
     </p:spTree>
     <p:extLst>
       <p:ext uri="{BB962C8B-B14F-4D97-AF65-F5344CB8AC3E}">

</xml_diff>